<commit_message>
po lekcji którą prowadziłem, wiele się nie zmeniło od poprzedniego commita
</commit_message>
<xml_diff>
--- a/moja_lekcja/prezentacja_psi/Franek_Garczorz_ZSPM_2cTi_Strony_Responsywne.pptx
+++ b/moja_lekcja/prezentacja_psi/Franek_Garczorz_ZSPM_2cTi_Strony_Responsywne.pptx
@@ -211,7 +211,7 @@
           <a:effectLst/>
           <a:extLst>
             <a:ext uri="{91240B29-F687-4f45-9708-019B960494DF}">
-              <a14:hiddenLine xmlns:a14="http://schemas.microsoft.com/office/drawing/2010/main" xmlns="" w="9525">
+              <a14:hiddenLine xmlns="" xmlns:a14="http://schemas.microsoft.com/office/drawing/2010/main" w="9525">
                 <a:solidFill>
                   <a:srgbClr val="000000"/>
                 </a:solidFill>
@@ -404,7 +404,7 @@
             <a:fld id="{08B9EBBA-996F-894A-B54A-D6246ED52CEA}" type="datetimeFigureOut">
               <a:rPr lang="en-US" dirty="0"/>
               <a:pPr/>
-              <a:t>3/21/2021</a:t>
+              <a:t>3/22/2021</a:t>
             </a:fld>
             <a:endParaRPr lang="en-US" dirty="0"/>
           </a:p>
@@ -719,7 +719,7 @@
             <a:fld id="{18C79C5D-2A6F-F04D-97DA-BEF2467B64E4}" type="datetimeFigureOut">
               <a:rPr lang="en-US" dirty="0"/>
               <a:pPr/>
-              <a:t>3/21/2021</a:t>
+              <a:t>3/22/2021</a:t>
             </a:fld>
             <a:endParaRPr lang="en-US" dirty="0"/>
           </a:p>
@@ -1204,7 +1204,7 @@
             <a:fld id="{8DFA1846-DA80-1C48-A609-854EA85C59AD}" type="datetimeFigureOut">
               <a:rPr lang="en-US" dirty="0"/>
               <a:pPr/>
-              <a:t>3/21/2021</a:t>
+              <a:t>3/22/2021</a:t>
             </a:fld>
             <a:endParaRPr lang="en-US" dirty="0"/>
           </a:p>
@@ -1570,7 +1570,7 @@
             <a:fld id="{FBF54567-0DE4-3F47-BF90-CB84690072F9}" type="datetimeFigureOut">
               <a:rPr lang="en-US" dirty="0"/>
               <a:pPr/>
-              <a:t>3/21/2021</a:t>
+              <a:t>3/22/2021</a:t>
             </a:fld>
             <a:endParaRPr lang="en-US" dirty="0"/>
           </a:p>
@@ -1721,7 +1721,7 @@
           <a:ln/>
           <a:extLst>
             <a:ext uri="{91240B29-F687-4f45-9708-019B960494DF}">
-              <a14:hiddenLine xmlns:a14="http://schemas.microsoft.com/office/drawing/2010/main" xmlns="" w="9525">
+              <a14:hiddenLine xmlns="" xmlns:a14="http://schemas.microsoft.com/office/drawing/2010/main" w="9525">
                 <a:solidFill>
                   <a:srgbClr val="000000"/>
                 </a:solidFill>
@@ -1840,7 +1840,7 @@
             <a:fld id="{C6C52C72-DE31-F449-A4ED-4C594FD91407}" type="datetimeFigureOut">
               <a:rPr lang="en-US" dirty="0"/>
               <a:pPr/>
-              <a:t>3/21/2021</a:t>
+              <a:t>3/22/2021</a:t>
             </a:fld>
             <a:endParaRPr lang="en-US" dirty="0"/>
           </a:p>
@@ -1993,7 +1993,7 @@
           <a:ln/>
           <a:extLst>
             <a:ext uri="{91240B29-F687-4f45-9708-019B960494DF}">
-              <a14:hiddenLine xmlns:a14="http://schemas.microsoft.com/office/drawing/2010/main" xmlns="" w="9525">
+              <a14:hiddenLine xmlns="" xmlns:a14="http://schemas.microsoft.com/office/drawing/2010/main" w="9525">
                 <a:solidFill>
                   <a:srgbClr val="000000"/>
                 </a:solidFill>
@@ -2122,7 +2122,7 @@
             <a:fld id="{ED62726E-379B-B349-9EED-81ED093FA806}" type="datetimeFigureOut">
               <a:rPr lang="en-US" dirty="0"/>
               <a:pPr/>
-              <a:t>3/21/2021</a:t>
+              <a:t>3/22/2021</a:t>
             </a:fld>
             <a:endParaRPr lang="en-US" dirty="0"/>
           </a:p>
@@ -2273,7 +2273,7 @@
           <a:ln/>
           <a:extLst>
             <a:ext uri="{91240B29-F687-4f45-9708-019B960494DF}">
-              <a14:hiddenLine xmlns:a14="http://schemas.microsoft.com/office/drawing/2010/main" xmlns="" w="9525">
+              <a14:hiddenLine xmlns="" xmlns:a14="http://schemas.microsoft.com/office/drawing/2010/main" w="9525">
                 <a:solidFill>
                   <a:srgbClr val="000000"/>
                 </a:solidFill>
@@ -2402,7 +2402,7 @@
             <a:fld id="{9B3A1323-8D79-1946-B0D7-40001CF92E9D}" type="datetimeFigureOut">
               <a:rPr lang="en-US" dirty="0"/>
               <a:pPr/>
-              <a:t>3/21/2021</a:t>
+              <a:t>3/22/2021</a:t>
             </a:fld>
             <a:endParaRPr lang="en-US" dirty="0"/>
           </a:p>
@@ -2742,7 +2742,7 @@
             <a:fld id="{8DFA1846-DA80-1C48-A609-854EA85C59AD}" type="datetimeFigureOut">
               <a:rPr lang="en-US" dirty="0"/>
               <a:pPr/>
-              <a:t>3/21/2021</a:t>
+              <a:t>3/22/2021</a:t>
             </a:fld>
             <a:endParaRPr lang="en-US" dirty="0"/>
           </a:p>
@@ -2893,7 +2893,7 @@
           <a:ln/>
           <a:extLst>
             <a:ext uri="{91240B29-F687-4f45-9708-019B960494DF}">
-              <a14:hiddenLine xmlns:a14="http://schemas.microsoft.com/office/drawing/2010/main" xmlns="" w="9525">
+              <a14:hiddenLine xmlns="" xmlns:a14="http://schemas.microsoft.com/office/drawing/2010/main" w="9525">
                 <a:solidFill>
                   <a:srgbClr val="000000"/>
                 </a:solidFill>
@@ -3078,7 +3078,7 @@
             <a:fld id="{57302355-E14B-8545-A8F8-0FE83CC9D524}" type="datetimeFigureOut">
               <a:rPr lang="en-US" dirty="0"/>
               <a:pPr/>
-              <a:t>3/21/2021</a:t>
+              <a:t>3/22/2021</a:t>
             </a:fld>
             <a:endParaRPr lang="en-US" dirty="0"/>
           </a:p>
@@ -3229,7 +3229,7 @@
           <a:ln/>
           <a:extLst>
             <a:ext uri="{91240B29-F687-4f45-9708-019B960494DF}">
-              <a14:hiddenLine xmlns:a14="http://schemas.microsoft.com/office/drawing/2010/main" xmlns="" w="9525">
+              <a14:hiddenLine xmlns="" xmlns:a14="http://schemas.microsoft.com/office/drawing/2010/main" w="9525">
                 <a:solidFill>
                   <a:srgbClr val="000000"/>
                 </a:solidFill>
@@ -3552,7 +3552,7 @@
             <a:fld id="{02640F58-564D-2B4F-AE67-E407BA4FCF45}" type="datetimeFigureOut">
               <a:rPr lang="en-US" dirty="0"/>
               <a:pPr/>
-              <a:t>3/21/2021</a:t>
+              <a:t>3/22/2021</a:t>
             </a:fld>
             <a:endParaRPr lang="en-US" dirty="0"/>
           </a:p>
@@ -3703,7 +3703,7 @@
           <a:ln/>
           <a:extLst>
             <a:ext uri="{91240B29-F687-4f45-9708-019B960494DF}">
-              <a14:hiddenLine xmlns:a14="http://schemas.microsoft.com/office/drawing/2010/main" xmlns="" w="9525">
+              <a14:hiddenLine xmlns="" xmlns:a14="http://schemas.microsoft.com/office/drawing/2010/main" w="9525">
                 <a:solidFill>
                   <a:srgbClr val="000000"/>
                 </a:solidFill>
@@ -3770,7 +3770,7 @@
             <a:fld id="{F13A34C8-038E-2045-AF43-DF7DBB8E0E9E}" type="datetimeFigureOut">
               <a:rPr lang="en-US" dirty="0"/>
               <a:pPr/>
-              <a:t>3/21/2021</a:t>
+              <a:t>3/22/2021</a:t>
             </a:fld>
             <a:endParaRPr lang="en-US" dirty="0"/>
           </a:p>
@@ -3862,7 +3862,7 @@
             <a:fld id="{8818C68F-D26B-8F47-958C-23B49CF8A634}" type="datetimeFigureOut">
               <a:rPr lang="en-US" dirty="0"/>
               <a:pPr/>
-              <a:t>3/21/2021</a:t>
+              <a:t>3/22/2021</a:t>
             </a:fld>
             <a:endParaRPr lang="en-US" dirty="0"/>
           </a:p>
@@ -4126,7 +4126,7 @@
           <a:ln/>
           <a:extLst>
             <a:ext uri="{91240B29-F687-4f45-9708-019B960494DF}">
-              <a14:hiddenLine xmlns:a14="http://schemas.microsoft.com/office/drawing/2010/main" xmlns="" w="9525">
+              <a14:hiddenLine xmlns="" xmlns:a14="http://schemas.microsoft.com/office/drawing/2010/main" w="9525">
                 <a:solidFill>
                   <a:srgbClr val="000000"/>
                 </a:solidFill>
@@ -4326,7 +4326,7 @@
             <a:fld id="{D0DF5E60-9974-AC48-9591-99C2BB44B7CF}" type="datetimeFigureOut">
               <a:rPr lang="en-US" dirty="0"/>
               <a:pPr/>
-              <a:t>3/21/2021</a:t>
+              <a:t>3/22/2021</a:t>
             </a:fld>
             <a:endParaRPr lang="en-US" dirty="0"/>
           </a:p>
@@ -4636,7 +4636,7 @@
             <a:fld id="{18C79C5D-2A6F-F04D-97DA-BEF2467B64E4}" type="datetimeFigureOut">
               <a:rPr lang="en-US" dirty="0"/>
               <a:pPr/>
-              <a:t>3/21/2021</a:t>
+              <a:t>3/22/2021</a:t>
             </a:fld>
             <a:endParaRPr lang="en-US" dirty="0"/>
           </a:p>
@@ -4903,7 +4903,7 @@
             <a:fld id="{09B482E8-6E0E-1B4F-B1FD-C69DB9E858D9}" type="datetimeFigureOut">
               <a:rPr lang="en-US" dirty="0"/>
               <a:pPr/>
-              <a:t>3/21/2021</a:t>
+              <a:t>3/22/2021</a:t>
             </a:fld>
             <a:endParaRPr lang="en-US" dirty="0"/>
           </a:p>
@@ -6643,10 +6643,10 @@
       </p:grpSpPr>
       <p:sp>
         <p:nvSpPr>
-          <p:cNvPr id="11" name="Prostokąt: zaokrąglone rogi 10">
+          <p:cNvPr id="15" name="Prostokąt: zaokrąglone rogi 14">
             <a:extLst>
               <a:ext uri="{FF2B5EF4-FFF2-40B4-BE49-F238E27FC236}">
-                <a16:creationId xmlns:a16="http://schemas.microsoft.com/office/drawing/2014/main" id="{4ACC9BB6-6EAD-4BE3-ACF8-CE4A9BB37E3E}"/>
+                <a16:creationId xmlns:a16="http://schemas.microsoft.com/office/drawing/2014/main" id="{1D40F91D-1BDD-409D-A8B4-D957F885B8DE}"/>
               </a:ext>
             </a:extLst>
           </p:cNvPr>
@@ -6655,8 +6655,8 @@
         </p:nvSpPr>
         <p:spPr>
           <a:xfrm>
-            <a:off x="8081394" y="5326414"/>
-            <a:ext cx="2457974" cy="923330"/>
+            <a:off x="8064615" y="5493977"/>
+            <a:ext cx="2701256" cy="923331"/>
           </a:xfrm>
           <a:prstGeom prst="roundRect">
             <a:avLst/>
@@ -6689,10 +6689,10 @@
       </p:sp>
       <p:sp>
         <p:nvSpPr>
-          <p:cNvPr id="10" name="Prostokąt: zaokrąglone rogi 9">
+          <p:cNvPr id="13" name="Prostokąt: zaokrąglone rogi 12">
             <a:extLst>
               <a:ext uri="{FF2B5EF4-FFF2-40B4-BE49-F238E27FC236}">
-                <a16:creationId xmlns:a16="http://schemas.microsoft.com/office/drawing/2014/main" id="{10642438-65D1-4284-AF19-FB96D9E07BBE}"/>
+                <a16:creationId xmlns:a16="http://schemas.microsoft.com/office/drawing/2014/main" id="{F02AB0C0-6E5C-4E51-BDF7-145DD667AA4E}"/>
               </a:ext>
             </a:extLst>
           </p:cNvPr>
@@ -6701,8 +6701,8 @@
         </p:nvSpPr>
         <p:spPr>
           <a:xfrm>
-            <a:off x="5335397" y="3636059"/>
-            <a:ext cx="2172750" cy="923330"/>
+            <a:off x="8724550" y="3586294"/>
+            <a:ext cx="2869035" cy="923330"/>
           </a:xfrm>
           <a:prstGeom prst="roundRect">
             <a:avLst/>
@@ -6735,10 +6735,10 @@
       </p:sp>
       <p:sp>
         <p:nvSpPr>
-          <p:cNvPr id="9" name="Prostokąt: zaokrąglone rogi 8">
+          <p:cNvPr id="11" name="Prostokąt: zaokrąglone rogi 10">
             <a:extLst>
               <a:ext uri="{FF2B5EF4-FFF2-40B4-BE49-F238E27FC236}">
-                <a16:creationId xmlns:a16="http://schemas.microsoft.com/office/drawing/2014/main" id="{BE7186D4-E8D7-44F9-9C5B-B1099EFE66BC}"/>
+                <a16:creationId xmlns:a16="http://schemas.microsoft.com/office/drawing/2014/main" id="{4ACC9BB6-6EAD-4BE3-ACF8-CE4A9BB37E3E}"/>
               </a:ext>
             </a:extLst>
           </p:cNvPr>
@@ -6747,8 +6747,8 @@
         </p:nvSpPr>
         <p:spPr>
           <a:xfrm>
-            <a:off x="2944534" y="4814686"/>
-            <a:ext cx="1996581" cy="646331"/>
+            <a:off x="4348294" y="5143340"/>
+            <a:ext cx="2457974" cy="923330"/>
           </a:xfrm>
           <a:prstGeom prst="roundRect">
             <a:avLst/>
@@ -6781,10 +6781,10 @@
       </p:sp>
       <p:sp>
         <p:nvSpPr>
-          <p:cNvPr id="8" name="Prostokąt: zaokrąglone rogi 7">
+          <p:cNvPr id="10" name="Prostokąt: zaokrąglone rogi 9">
             <a:extLst>
               <a:ext uri="{FF2B5EF4-FFF2-40B4-BE49-F238E27FC236}">
-                <a16:creationId xmlns:a16="http://schemas.microsoft.com/office/drawing/2014/main" id="{DEF3207B-D274-4125-83B8-C886B288D699}"/>
+                <a16:creationId xmlns:a16="http://schemas.microsoft.com/office/drawing/2014/main" id="{10642438-65D1-4284-AF19-FB96D9E07BBE}"/>
               </a:ext>
             </a:extLst>
           </p:cNvPr>
@@ -6793,8 +6793,8 @@
         </p:nvSpPr>
         <p:spPr>
           <a:xfrm>
-            <a:off x="880845" y="3586294"/>
-            <a:ext cx="2457974" cy="646331"/>
+            <a:off x="5335397" y="3636059"/>
+            <a:ext cx="2172750" cy="923330"/>
           </a:xfrm>
           <a:prstGeom prst="roundRect">
             <a:avLst/>
@@ -6827,6 +6827,98 @@
       </p:sp>
       <p:sp>
         <p:nvSpPr>
+          <p:cNvPr id="9" name="Prostokąt: zaokrąglone rogi 8">
+            <a:extLst>
+              <a:ext uri="{FF2B5EF4-FFF2-40B4-BE49-F238E27FC236}">
+                <a16:creationId xmlns:a16="http://schemas.microsoft.com/office/drawing/2014/main" id="{BE7186D4-E8D7-44F9-9C5B-B1099EFE66BC}"/>
+              </a:ext>
+            </a:extLst>
+          </p:cNvPr>
+          <p:cNvSpPr/>
+          <p:nvPr/>
+        </p:nvSpPr>
+        <p:spPr>
+          <a:xfrm>
+            <a:off x="1426128" y="5527642"/>
+            <a:ext cx="1996581" cy="646331"/>
+          </a:xfrm>
+          <a:prstGeom prst="roundRect">
+            <a:avLst/>
+          </a:prstGeom>
+        </p:spPr>
+        <p:style>
+          <a:lnRef idx="2">
+            <a:schemeClr val="accent1">
+              <a:shade val="50000"/>
+            </a:schemeClr>
+          </a:lnRef>
+          <a:fillRef idx="1">
+            <a:schemeClr val="accent1"/>
+          </a:fillRef>
+          <a:effectRef idx="0">
+            <a:schemeClr val="accent1"/>
+          </a:effectRef>
+          <a:fontRef idx="minor">
+            <a:schemeClr val="lt1"/>
+          </a:fontRef>
+        </p:style>
+        <p:txBody>
+          <a:bodyPr rtlCol="0" anchor="ctr"/>
+          <a:lstStyle/>
+          <a:p>
+            <a:pPr algn="ctr"/>
+            <a:endParaRPr lang="pl-PL"/>
+          </a:p>
+        </p:txBody>
+      </p:sp>
+      <p:sp>
+        <p:nvSpPr>
+          <p:cNvPr id="8" name="Prostokąt: zaokrąglone rogi 7">
+            <a:extLst>
+              <a:ext uri="{FF2B5EF4-FFF2-40B4-BE49-F238E27FC236}">
+                <a16:creationId xmlns:a16="http://schemas.microsoft.com/office/drawing/2014/main" id="{DEF3207B-D274-4125-83B8-C886B288D699}"/>
+              </a:ext>
+            </a:extLst>
+          </p:cNvPr>
+          <p:cNvSpPr/>
+          <p:nvPr/>
+        </p:nvSpPr>
+        <p:spPr>
+          <a:xfrm>
+            <a:off x="880845" y="3586294"/>
+            <a:ext cx="2457974" cy="646331"/>
+          </a:xfrm>
+          <a:prstGeom prst="roundRect">
+            <a:avLst/>
+          </a:prstGeom>
+        </p:spPr>
+        <p:style>
+          <a:lnRef idx="2">
+            <a:schemeClr val="accent1">
+              <a:shade val="50000"/>
+            </a:schemeClr>
+          </a:lnRef>
+          <a:fillRef idx="1">
+            <a:schemeClr val="accent1"/>
+          </a:fillRef>
+          <a:effectRef idx="0">
+            <a:schemeClr val="accent1"/>
+          </a:effectRef>
+          <a:fontRef idx="minor">
+            <a:schemeClr val="lt1"/>
+          </a:fontRef>
+        </p:style>
+        <p:txBody>
+          <a:bodyPr rtlCol="0" anchor="ctr"/>
+          <a:lstStyle/>
+          <a:p>
+            <a:pPr algn="ctr"/>
+            <a:endParaRPr lang="pl-PL"/>
+          </a:p>
+        </p:txBody>
+      </p:sp>
+      <p:sp>
+        <p:nvSpPr>
           <p:cNvPr id="2" name="Tytuł 1">
             <a:extLst>
               <a:ext uri="{FF2B5EF4-FFF2-40B4-BE49-F238E27FC236}">
@@ -7024,7 +7116,7 @@
         </p:nvSpPr>
         <p:spPr>
           <a:xfrm>
-            <a:off x="8081394" y="5326414"/>
+            <a:off x="4348294" y="5141856"/>
             <a:ext cx="2457974" cy="923330"/>
           </a:xfrm>
           <a:prstGeom prst="rect">
@@ -7064,7 +7156,7 @@
         </p:nvSpPr>
         <p:spPr>
           <a:xfrm>
-            <a:off x="2944536" y="4814686"/>
+            <a:off x="1426129" y="5493978"/>
             <a:ext cx="1996580" cy="646331"/>
           </a:xfrm>
           <a:prstGeom prst="rect">
@@ -7082,6 +7174,86 @@
             <a:r>
               <a:rPr lang="pl-PL" dirty="0"/>
               <a:t>%- po prostu % danej wartości</a:t>
+            </a:r>
+          </a:p>
+        </p:txBody>
+      </p:sp>
+      <p:sp>
+        <p:nvSpPr>
+          <p:cNvPr id="12" name="pole tekstowe 11">
+            <a:extLst>
+              <a:ext uri="{FF2B5EF4-FFF2-40B4-BE49-F238E27FC236}">
+                <a16:creationId xmlns:a16="http://schemas.microsoft.com/office/drawing/2014/main" id="{DD1D4A9F-373A-4E66-A316-9F607C9E2049}"/>
+              </a:ext>
+            </a:extLst>
+          </p:cNvPr>
+          <p:cNvSpPr txBox="1"/>
+          <p:nvPr/>
+        </p:nvSpPr>
+        <p:spPr>
+          <a:xfrm>
+            <a:off x="8724550" y="3586294"/>
+            <a:ext cx="2869035" cy="923330"/>
+          </a:xfrm>
+          <a:prstGeom prst="rect">
+            <a:avLst/>
+          </a:prstGeom>
+          <a:noFill/>
+        </p:spPr>
+        <p:txBody>
+          <a:bodyPr wrap="square" rtlCol="0" anchor="ctr">
+            <a:spAutoFit/>
+          </a:bodyPr>
+          <a:lstStyle/>
+          <a:p>
+            <a:pPr algn="ctr"/>
+            <a:r>
+              <a:rPr lang="pl-PL" dirty="0"/>
+              <a:t>em- działa jak x, może być zmienny dla </a:t>
+            </a:r>
+            <a:r>
+              <a:rPr lang="pl-PL" dirty="0" err="1"/>
+              <a:t>każego</a:t>
+            </a:r>
+            <a:r>
+              <a:rPr lang="pl-PL" dirty="0"/>
+              <a:t> elementu</a:t>
+            </a:r>
+          </a:p>
+        </p:txBody>
+      </p:sp>
+      <p:sp>
+        <p:nvSpPr>
+          <p:cNvPr id="14" name="pole tekstowe 13">
+            <a:extLst>
+              <a:ext uri="{FF2B5EF4-FFF2-40B4-BE49-F238E27FC236}">
+                <a16:creationId xmlns:a16="http://schemas.microsoft.com/office/drawing/2014/main" id="{1FFCFE8A-BCC5-49B3-865F-8AE5D0A87BF8}"/>
+              </a:ext>
+            </a:extLst>
+          </p:cNvPr>
+          <p:cNvSpPr txBox="1"/>
+          <p:nvPr/>
+        </p:nvSpPr>
+        <p:spPr>
+          <a:xfrm>
+            <a:off x="8064615" y="5493978"/>
+            <a:ext cx="2701256" cy="923330"/>
+          </a:xfrm>
+          <a:prstGeom prst="rect">
+            <a:avLst/>
+          </a:prstGeom>
+          <a:noFill/>
+        </p:spPr>
+        <p:txBody>
+          <a:bodyPr wrap="square" rtlCol="0" anchor="ctr">
+            <a:spAutoFit/>
+          </a:bodyPr>
+          <a:lstStyle/>
+          <a:p>
+            <a:pPr algn="ctr"/>
+            <a:r>
+              <a:rPr lang="pl-PL" dirty="0"/>
+              <a:t>rem- działa jak x, jest taki sam dla całego dokumentu</a:t>
             </a:r>
           </a:p>
         </p:txBody>

</xml_diff>